<commit_message>
update controllers and databases
</commit_message>
<xml_diff>
--- a/documents/screens.pptx
+++ b/documents/screens.pptx
@@ -12,6 +12,7 @@
     <p:sldId id="268" r:id="rId6"/>
     <p:sldId id="269" r:id="rId7"/>
     <p:sldId id="259" r:id="rId8"/>
+    <p:sldId id="270" r:id="rId9"/>
   </p:sldIdLst>
   <p:sldSz cx="12192000" cy="6858000"/>
   <p:notesSz cx="6858000" cy="9144000"/>
@@ -136,6 +137,14 @@
             <p14:sldId id="259"/>
           </p14:sldIdLst>
         </p14:section>
+        <p14:section name="CONFIG" id="{22FC5444-6B06-4B8C-92FB-259693561713}">
+          <p14:sldIdLst>
+            <p14:sldId id="270"/>
+          </p14:sldIdLst>
+        </p14:section>
+        <p14:section name="Untitled Section" id="{8245A160-BE97-4E78-8E54-71354778499D}">
+          <p14:sldIdLst/>
+        </p14:section>
       </p14:sectionLst>
     </p:ext>
     <p:ext uri="{EFAFB233-063F-42B5-8137-9DF3F51BA10A}">
@@ -292,7 +301,7 @@
           <a:p>
             <a:fld id="{D0745D6A-C28D-4A5B-8BAC-80469F95F215}" type="datetimeFigureOut">
               <a:rPr lang="en-US" smtClean="0"/>
-              <a:t>6/2/2020</a:t>
+              <a:t>6/15/2020</a:t>
             </a:fld>
             <a:endParaRPr lang="en-US"/>
           </a:p>
@@ -490,7 +499,7 @@
           <a:p>
             <a:fld id="{D0745D6A-C28D-4A5B-8BAC-80469F95F215}" type="datetimeFigureOut">
               <a:rPr lang="en-US" smtClean="0"/>
-              <a:t>6/2/2020</a:t>
+              <a:t>6/15/2020</a:t>
             </a:fld>
             <a:endParaRPr lang="en-US"/>
           </a:p>
@@ -698,7 +707,7 @@
           <a:p>
             <a:fld id="{D0745D6A-C28D-4A5B-8BAC-80469F95F215}" type="datetimeFigureOut">
               <a:rPr lang="en-US" smtClean="0"/>
-              <a:t>6/2/2020</a:t>
+              <a:t>6/15/2020</a:t>
             </a:fld>
             <a:endParaRPr lang="en-US"/>
           </a:p>
@@ -896,7 +905,7 @@
           <a:p>
             <a:fld id="{D0745D6A-C28D-4A5B-8BAC-80469F95F215}" type="datetimeFigureOut">
               <a:rPr lang="en-US" smtClean="0"/>
-              <a:t>6/2/2020</a:t>
+              <a:t>6/15/2020</a:t>
             </a:fld>
             <a:endParaRPr lang="en-US"/>
           </a:p>
@@ -1171,7 +1180,7 @@
           <a:p>
             <a:fld id="{D0745D6A-C28D-4A5B-8BAC-80469F95F215}" type="datetimeFigureOut">
               <a:rPr lang="en-US" smtClean="0"/>
-              <a:t>6/2/2020</a:t>
+              <a:t>6/15/2020</a:t>
             </a:fld>
             <a:endParaRPr lang="en-US"/>
           </a:p>
@@ -1436,7 +1445,7 @@
           <a:p>
             <a:fld id="{D0745D6A-C28D-4A5B-8BAC-80469F95F215}" type="datetimeFigureOut">
               <a:rPr lang="en-US" smtClean="0"/>
-              <a:t>6/2/2020</a:t>
+              <a:t>6/15/2020</a:t>
             </a:fld>
             <a:endParaRPr lang="en-US"/>
           </a:p>
@@ -1848,7 +1857,7 @@
           <a:p>
             <a:fld id="{D0745D6A-C28D-4A5B-8BAC-80469F95F215}" type="datetimeFigureOut">
               <a:rPr lang="en-US" smtClean="0"/>
-              <a:t>6/2/2020</a:t>
+              <a:t>6/15/2020</a:t>
             </a:fld>
             <a:endParaRPr lang="en-US"/>
           </a:p>
@@ -1989,7 +1998,7 @@
           <a:p>
             <a:fld id="{D0745D6A-C28D-4A5B-8BAC-80469F95F215}" type="datetimeFigureOut">
               <a:rPr lang="en-US" smtClean="0"/>
-              <a:t>6/2/2020</a:t>
+              <a:t>6/15/2020</a:t>
             </a:fld>
             <a:endParaRPr lang="en-US"/>
           </a:p>
@@ -2102,7 +2111,7 @@
           <a:p>
             <a:fld id="{D0745D6A-C28D-4A5B-8BAC-80469F95F215}" type="datetimeFigureOut">
               <a:rPr lang="en-US" smtClean="0"/>
-              <a:t>6/2/2020</a:t>
+              <a:t>6/15/2020</a:t>
             </a:fld>
             <a:endParaRPr lang="en-US"/>
           </a:p>
@@ -2413,7 +2422,7 @@
           <a:p>
             <a:fld id="{D0745D6A-C28D-4A5B-8BAC-80469F95F215}" type="datetimeFigureOut">
               <a:rPr lang="en-US" smtClean="0"/>
-              <a:t>6/2/2020</a:t>
+              <a:t>6/15/2020</a:t>
             </a:fld>
             <a:endParaRPr lang="en-US"/>
           </a:p>
@@ -2701,7 +2710,7 @@
           <a:p>
             <a:fld id="{D0745D6A-C28D-4A5B-8BAC-80469F95F215}" type="datetimeFigureOut">
               <a:rPr lang="en-US" smtClean="0"/>
-              <a:t>6/2/2020</a:t>
+              <a:t>6/15/2020</a:t>
             </a:fld>
             <a:endParaRPr lang="en-US"/>
           </a:p>
@@ -2942,7 +2951,7 @@
           <a:p>
             <a:fld id="{D0745D6A-C28D-4A5B-8BAC-80469F95F215}" type="datetimeFigureOut">
               <a:rPr lang="en-US" smtClean="0"/>
-              <a:t>6/2/2020</a:t>
+              <a:t>6/15/2020</a:t>
             </a:fld>
             <a:endParaRPr lang="en-US"/>
           </a:p>
@@ -6698,7 +6707,7 @@
         </p:nvSpPr>
         <p:spPr>
           <a:xfrm>
-            <a:off x="2299856" y="1394708"/>
+            <a:off x="2299854" y="1293108"/>
             <a:ext cx="8497455" cy="665018"/>
           </a:xfrm>
           <a:prstGeom prst="rect">
@@ -6809,24 +6818,21 @@
         </p:nvSpPr>
         <p:spPr>
           <a:xfrm>
-            <a:off x="2299855" y="2299847"/>
-            <a:ext cx="8497455" cy="665018"/>
-          </a:xfrm>
-          <a:prstGeom prst="rect">
-            <a:avLst/>
-          </a:prstGeom>
-          <a:noFill/>
+            <a:off x="2299854" y="2096688"/>
+            <a:ext cx="4248728" cy="665018"/>
+          </a:xfrm>
+          <a:prstGeom prst="rect">
+            <a:avLst/>
+          </a:prstGeom>
         </p:spPr>
         <p:style>
-          <a:lnRef idx="2">
-            <a:schemeClr val="accent1">
-              <a:shade val="50000"/>
-            </a:schemeClr>
+          <a:lnRef idx="3">
+            <a:schemeClr val="lt1"/>
           </a:lnRef>
           <a:fillRef idx="1">
             <a:schemeClr val="accent1"/>
           </a:fillRef>
-          <a:effectRef idx="0">
+          <a:effectRef idx="1">
             <a:schemeClr val="accent1"/>
           </a:effectRef>
           <a:fontRef idx="minor">
@@ -6844,7 +6850,862 @@
                   <a:sysClr val="windowText" lastClr="000000"/>
                 </a:solidFill>
               </a:rPr>
-              <a:t>LER PEÇA?</a:t>
+              <a:t>TABLETS</a:t>
+            </a:r>
+          </a:p>
+        </p:txBody>
+      </p:sp>
+      <p:sp>
+        <p:nvSpPr>
+          <p:cNvPr id="6" name="Rectangle 5">
+            <a:extLst>
+              <a:ext uri="{FF2B5EF4-FFF2-40B4-BE49-F238E27FC236}">
+                <a16:creationId xmlns:a16="http://schemas.microsoft.com/office/drawing/2014/main" id="{49D29CB4-F2DC-40AB-BD83-970032F29DAF}"/>
+              </a:ext>
+            </a:extLst>
+          </p:cNvPr>
+          <p:cNvSpPr/>
+          <p:nvPr/>
+        </p:nvSpPr>
+        <p:spPr>
+          <a:xfrm>
+            <a:off x="6668656" y="2096688"/>
+            <a:ext cx="4128654" cy="665018"/>
+          </a:xfrm>
+          <a:prstGeom prst="rect">
+            <a:avLst/>
+          </a:prstGeom>
+          <a:noFill/>
+        </p:spPr>
+        <p:style>
+          <a:lnRef idx="2">
+            <a:schemeClr val="accent1">
+              <a:shade val="50000"/>
+            </a:schemeClr>
+          </a:lnRef>
+          <a:fillRef idx="1">
+            <a:schemeClr val="accent1"/>
+          </a:fillRef>
+          <a:effectRef idx="0">
+            <a:schemeClr val="accent1"/>
+          </a:effectRef>
+          <a:fontRef idx="minor">
+            <a:schemeClr val="lt1"/>
+          </a:fontRef>
+        </p:style>
+        <p:txBody>
+          <a:bodyPr rtlCol="0" anchor="ctr"/>
+          <a:lstStyle/>
+          <a:p>
+            <a:pPr algn="ctr"/>
+            <a:r>
+              <a:rPr lang="en-US" sz="4000" dirty="0">
+                <a:solidFill>
+                  <a:sysClr val="windowText" lastClr="000000"/>
+                </a:solidFill>
+              </a:rPr>
+              <a:t>INSTANCIAS</a:t>
+            </a:r>
+          </a:p>
+        </p:txBody>
+      </p:sp>
+      <p:sp>
+        <p:nvSpPr>
+          <p:cNvPr id="7" name="Rectangle 6">
+            <a:extLst>
+              <a:ext uri="{FF2B5EF4-FFF2-40B4-BE49-F238E27FC236}">
+                <a16:creationId xmlns:a16="http://schemas.microsoft.com/office/drawing/2014/main" id="{F788C2CE-7DA8-48A3-9D27-6DDECAE6062B}"/>
+              </a:ext>
+            </a:extLst>
+          </p:cNvPr>
+          <p:cNvSpPr/>
+          <p:nvPr/>
+        </p:nvSpPr>
+        <p:spPr>
+          <a:xfrm>
+            <a:off x="2299854" y="2900268"/>
+            <a:ext cx="628074" cy="406400"/>
+          </a:xfrm>
+          <a:prstGeom prst="rect">
+            <a:avLst/>
+          </a:prstGeom>
+          <a:noFill/>
+        </p:spPr>
+        <p:style>
+          <a:lnRef idx="2">
+            <a:schemeClr val="accent1">
+              <a:shade val="50000"/>
+            </a:schemeClr>
+          </a:lnRef>
+          <a:fillRef idx="1">
+            <a:schemeClr val="accent1"/>
+          </a:fillRef>
+          <a:effectRef idx="0">
+            <a:schemeClr val="accent1"/>
+          </a:effectRef>
+          <a:fontRef idx="minor">
+            <a:schemeClr val="lt1"/>
+          </a:fontRef>
+        </p:style>
+        <p:txBody>
+          <a:bodyPr rtlCol="0" anchor="ctr"/>
+          <a:lstStyle/>
+          <a:p>
+            <a:pPr algn="ctr"/>
+            <a:r>
+              <a:rPr lang="en-US" sz="2000" dirty="0">
+                <a:solidFill>
+                  <a:sysClr val="windowText" lastClr="000000"/>
+                </a:solidFill>
+              </a:rPr>
+              <a:t>ID</a:t>
+            </a:r>
+          </a:p>
+        </p:txBody>
+      </p:sp>
+      <p:sp>
+        <p:nvSpPr>
+          <p:cNvPr id="8" name="Rectangle 7">
+            <a:extLst>
+              <a:ext uri="{FF2B5EF4-FFF2-40B4-BE49-F238E27FC236}">
+                <a16:creationId xmlns:a16="http://schemas.microsoft.com/office/drawing/2014/main" id="{511256CA-35C8-4664-9CB8-BE290A0F00F8}"/>
+              </a:ext>
+            </a:extLst>
+          </p:cNvPr>
+          <p:cNvSpPr/>
+          <p:nvPr/>
+        </p:nvSpPr>
+        <p:spPr>
+          <a:xfrm>
+            <a:off x="2297546" y="4876378"/>
+            <a:ext cx="8497455" cy="406400"/>
+          </a:xfrm>
+          <a:prstGeom prst="rect">
+            <a:avLst/>
+          </a:prstGeom>
+          <a:noFill/>
+        </p:spPr>
+        <p:style>
+          <a:lnRef idx="2">
+            <a:schemeClr val="accent1">
+              <a:shade val="50000"/>
+            </a:schemeClr>
+          </a:lnRef>
+          <a:fillRef idx="1">
+            <a:schemeClr val="accent1"/>
+          </a:fillRef>
+          <a:effectRef idx="0">
+            <a:schemeClr val="accent1"/>
+          </a:effectRef>
+          <a:fontRef idx="minor">
+            <a:schemeClr val="lt1"/>
+          </a:fontRef>
+        </p:style>
+        <p:txBody>
+          <a:bodyPr rtlCol="0" anchor="ctr"/>
+          <a:lstStyle/>
+          <a:p>
+            <a:pPr algn="ctr"/>
+            <a:endParaRPr lang="en-US" sz="4000" dirty="0">
+              <a:solidFill>
+                <a:sysClr val="windowText" lastClr="000000"/>
+              </a:solidFill>
+            </a:endParaRPr>
+          </a:p>
+        </p:txBody>
+      </p:sp>
+      <p:sp>
+        <p:nvSpPr>
+          <p:cNvPr id="9" name="Rectangle 8">
+            <a:extLst>
+              <a:ext uri="{FF2B5EF4-FFF2-40B4-BE49-F238E27FC236}">
+                <a16:creationId xmlns:a16="http://schemas.microsoft.com/office/drawing/2014/main" id="{A63EEEF5-AC7D-4A6C-8D22-B131B667A549}"/>
+              </a:ext>
+            </a:extLst>
+          </p:cNvPr>
+          <p:cNvSpPr/>
+          <p:nvPr/>
+        </p:nvSpPr>
+        <p:spPr>
+          <a:xfrm>
+            <a:off x="2297545" y="5339458"/>
+            <a:ext cx="8497455" cy="406400"/>
+          </a:xfrm>
+          <a:prstGeom prst="rect">
+            <a:avLst/>
+          </a:prstGeom>
+          <a:noFill/>
+        </p:spPr>
+        <p:style>
+          <a:lnRef idx="2">
+            <a:schemeClr val="accent1">
+              <a:shade val="50000"/>
+            </a:schemeClr>
+          </a:lnRef>
+          <a:fillRef idx="1">
+            <a:schemeClr val="accent1"/>
+          </a:fillRef>
+          <a:effectRef idx="0">
+            <a:schemeClr val="accent1"/>
+          </a:effectRef>
+          <a:fontRef idx="minor">
+            <a:schemeClr val="lt1"/>
+          </a:fontRef>
+        </p:style>
+        <p:txBody>
+          <a:bodyPr rtlCol="0" anchor="ctr"/>
+          <a:lstStyle/>
+          <a:p>
+            <a:pPr algn="ctr"/>
+            <a:endParaRPr lang="en-US" sz="4000" dirty="0">
+              <a:solidFill>
+                <a:sysClr val="windowText" lastClr="000000"/>
+              </a:solidFill>
+            </a:endParaRPr>
+          </a:p>
+        </p:txBody>
+      </p:sp>
+      <p:sp>
+        <p:nvSpPr>
+          <p:cNvPr id="11" name="Rectangle 10">
+            <a:extLst>
+              <a:ext uri="{FF2B5EF4-FFF2-40B4-BE49-F238E27FC236}">
+                <a16:creationId xmlns:a16="http://schemas.microsoft.com/office/drawing/2014/main" id="{1F4CCA34-6EFA-46F8-807A-6846549542F6}"/>
+              </a:ext>
+            </a:extLst>
+          </p:cNvPr>
+          <p:cNvSpPr/>
+          <p:nvPr/>
+        </p:nvSpPr>
+        <p:spPr>
+          <a:xfrm>
+            <a:off x="2297546" y="4413298"/>
+            <a:ext cx="8497455" cy="406400"/>
+          </a:xfrm>
+          <a:prstGeom prst="rect">
+            <a:avLst/>
+          </a:prstGeom>
+          <a:noFill/>
+        </p:spPr>
+        <p:style>
+          <a:lnRef idx="2">
+            <a:schemeClr val="accent1">
+              <a:shade val="50000"/>
+            </a:schemeClr>
+          </a:lnRef>
+          <a:fillRef idx="1">
+            <a:schemeClr val="accent1"/>
+          </a:fillRef>
+          <a:effectRef idx="0">
+            <a:schemeClr val="accent1"/>
+          </a:effectRef>
+          <a:fontRef idx="minor">
+            <a:schemeClr val="lt1"/>
+          </a:fontRef>
+        </p:style>
+        <p:txBody>
+          <a:bodyPr rtlCol="0" anchor="ctr"/>
+          <a:lstStyle/>
+          <a:p>
+            <a:pPr algn="ctr"/>
+            <a:endParaRPr lang="en-US" sz="4000" dirty="0">
+              <a:solidFill>
+                <a:sysClr val="windowText" lastClr="000000"/>
+              </a:solidFill>
+            </a:endParaRPr>
+          </a:p>
+        </p:txBody>
+      </p:sp>
+      <p:sp>
+        <p:nvSpPr>
+          <p:cNvPr id="17" name="Rectangle 16">
+            <a:extLst>
+              <a:ext uri="{FF2B5EF4-FFF2-40B4-BE49-F238E27FC236}">
+                <a16:creationId xmlns:a16="http://schemas.microsoft.com/office/drawing/2014/main" id="{BE0E6460-3D59-4D31-AEFC-AE479A507D69}"/>
+              </a:ext>
+            </a:extLst>
+          </p:cNvPr>
+          <p:cNvSpPr/>
+          <p:nvPr/>
+        </p:nvSpPr>
+        <p:spPr>
+          <a:xfrm>
+            <a:off x="4378037" y="2903226"/>
+            <a:ext cx="628074" cy="406400"/>
+          </a:xfrm>
+          <a:prstGeom prst="rect">
+            <a:avLst/>
+          </a:prstGeom>
+          <a:noFill/>
+        </p:spPr>
+        <p:style>
+          <a:lnRef idx="2">
+            <a:schemeClr val="accent1">
+              <a:shade val="50000"/>
+            </a:schemeClr>
+          </a:lnRef>
+          <a:fillRef idx="1">
+            <a:schemeClr val="accent1"/>
+          </a:fillRef>
+          <a:effectRef idx="0">
+            <a:schemeClr val="accent1"/>
+          </a:effectRef>
+          <a:fontRef idx="minor">
+            <a:schemeClr val="lt1"/>
+          </a:fontRef>
+        </p:style>
+        <p:txBody>
+          <a:bodyPr rtlCol="0" anchor="ctr"/>
+          <a:lstStyle/>
+          <a:p>
+            <a:pPr algn="ctr"/>
+            <a:r>
+              <a:rPr lang="en-US" sz="2000" dirty="0">
+                <a:solidFill>
+                  <a:sysClr val="windowText" lastClr="000000"/>
+                </a:solidFill>
+              </a:rPr>
+              <a:t>IP</a:t>
+            </a:r>
+          </a:p>
+        </p:txBody>
+      </p:sp>
+      <p:sp>
+        <p:nvSpPr>
+          <p:cNvPr id="18" name="Rectangle 17">
+            <a:extLst>
+              <a:ext uri="{FF2B5EF4-FFF2-40B4-BE49-F238E27FC236}">
+                <a16:creationId xmlns:a16="http://schemas.microsoft.com/office/drawing/2014/main" id="{9A1AF453-8D36-4BC7-BF73-E23180589924}"/>
+              </a:ext>
+            </a:extLst>
+          </p:cNvPr>
+          <p:cNvSpPr/>
+          <p:nvPr/>
+        </p:nvSpPr>
+        <p:spPr>
+          <a:xfrm>
+            <a:off x="5301672" y="2900268"/>
+            <a:ext cx="1348509" cy="406400"/>
+          </a:xfrm>
+          <a:prstGeom prst="rect">
+            <a:avLst/>
+          </a:prstGeom>
+          <a:noFill/>
+        </p:spPr>
+        <p:style>
+          <a:lnRef idx="2">
+            <a:schemeClr val="accent1">
+              <a:shade val="50000"/>
+            </a:schemeClr>
+          </a:lnRef>
+          <a:fillRef idx="1">
+            <a:schemeClr val="accent1"/>
+          </a:fillRef>
+          <a:effectRef idx="0">
+            <a:schemeClr val="accent1"/>
+          </a:effectRef>
+          <a:fontRef idx="minor">
+            <a:schemeClr val="lt1"/>
+          </a:fontRef>
+        </p:style>
+        <p:txBody>
+          <a:bodyPr rtlCol="0" anchor="ctr"/>
+          <a:lstStyle/>
+          <a:p>
+            <a:pPr algn="ctr"/>
+            <a:r>
+              <a:rPr lang="en-US" sz="2000" dirty="0">
+                <a:solidFill>
+                  <a:sysClr val="windowText" lastClr="000000"/>
+                </a:solidFill>
+              </a:rPr>
+              <a:t>INSTANCIA</a:t>
+            </a:r>
+          </a:p>
+        </p:txBody>
+      </p:sp>
+      <p:sp>
+        <p:nvSpPr>
+          <p:cNvPr id="19" name="Rectangle 18">
+            <a:extLst>
+              <a:ext uri="{FF2B5EF4-FFF2-40B4-BE49-F238E27FC236}">
+                <a16:creationId xmlns:a16="http://schemas.microsoft.com/office/drawing/2014/main" id="{06C122F2-39D3-4773-85B4-A7DBF458ADA3}"/>
+              </a:ext>
+            </a:extLst>
+          </p:cNvPr>
+          <p:cNvSpPr/>
+          <p:nvPr/>
+        </p:nvSpPr>
+        <p:spPr>
+          <a:xfrm>
+            <a:off x="6825672" y="2900268"/>
+            <a:ext cx="1348509" cy="406400"/>
+          </a:xfrm>
+          <a:prstGeom prst="rect">
+            <a:avLst/>
+          </a:prstGeom>
+          <a:noFill/>
+        </p:spPr>
+        <p:style>
+          <a:lnRef idx="2">
+            <a:schemeClr val="accent1">
+              <a:shade val="50000"/>
+            </a:schemeClr>
+          </a:lnRef>
+          <a:fillRef idx="1">
+            <a:schemeClr val="accent1"/>
+          </a:fillRef>
+          <a:effectRef idx="0">
+            <a:schemeClr val="accent1"/>
+          </a:effectRef>
+          <a:fontRef idx="minor">
+            <a:schemeClr val="lt1"/>
+          </a:fontRef>
+        </p:style>
+        <p:txBody>
+          <a:bodyPr rtlCol="0" anchor="ctr"/>
+          <a:lstStyle/>
+          <a:p>
+            <a:pPr algn="ctr"/>
+            <a:r>
+              <a:rPr lang="en-US" sz="2000" dirty="0">
+                <a:solidFill>
+                  <a:sysClr val="windowText" lastClr="000000"/>
+                </a:solidFill>
+              </a:rPr>
+              <a:t>USUARIO</a:t>
+            </a:r>
+          </a:p>
+        </p:txBody>
+      </p:sp>
+      <p:sp>
+        <p:nvSpPr>
+          <p:cNvPr id="22" name="Rectangle 21">
+            <a:extLst>
+              <a:ext uri="{FF2B5EF4-FFF2-40B4-BE49-F238E27FC236}">
+                <a16:creationId xmlns:a16="http://schemas.microsoft.com/office/drawing/2014/main" id="{E42EC5B2-AC7A-4CB7-873F-46CC99ED3368}"/>
+              </a:ext>
+            </a:extLst>
+          </p:cNvPr>
+          <p:cNvSpPr/>
+          <p:nvPr/>
+        </p:nvSpPr>
+        <p:spPr>
+          <a:xfrm>
+            <a:off x="9003149" y="4482052"/>
+            <a:ext cx="687688" cy="295123"/>
+          </a:xfrm>
+          <a:prstGeom prst="rect">
+            <a:avLst/>
+          </a:prstGeom>
+          <a:noFill/>
+        </p:spPr>
+        <p:style>
+          <a:lnRef idx="2">
+            <a:schemeClr val="accent1">
+              <a:shade val="50000"/>
+            </a:schemeClr>
+          </a:lnRef>
+          <a:fillRef idx="1">
+            <a:schemeClr val="accent1"/>
+          </a:fillRef>
+          <a:effectRef idx="0">
+            <a:schemeClr val="accent1"/>
+          </a:effectRef>
+          <a:fontRef idx="minor">
+            <a:schemeClr val="lt1"/>
+          </a:fontRef>
+        </p:style>
+        <p:txBody>
+          <a:bodyPr rtlCol="0" anchor="ctr"/>
+          <a:lstStyle/>
+          <a:p>
+            <a:pPr algn="ctr"/>
+            <a:r>
+              <a:rPr lang="en-US" sz="1200" dirty="0">
+                <a:solidFill>
+                  <a:sysClr val="windowText" lastClr="000000"/>
+                </a:solidFill>
+              </a:rPr>
+              <a:t>EDITAR</a:t>
+            </a:r>
+          </a:p>
+        </p:txBody>
+      </p:sp>
+      <p:sp>
+        <p:nvSpPr>
+          <p:cNvPr id="23" name="Rectangle 22">
+            <a:extLst>
+              <a:ext uri="{FF2B5EF4-FFF2-40B4-BE49-F238E27FC236}">
+                <a16:creationId xmlns:a16="http://schemas.microsoft.com/office/drawing/2014/main" id="{EE8A9930-19D4-465E-801D-609FCBD89FED}"/>
+              </a:ext>
+            </a:extLst>
+          </p:cNvPr>
+          <p:cNvSpPr/>
+          <p:nvPr/>
+        </p:nvSpPr>
+        <p:spPr>
+          <a:xfrm>
+            <a:off x="9792859" y="4482051"/>
+            <a:ext cx="789707" cy="295123"/>
+          </a:xfrm>
+          <a:prstGeom prst="rect">
+            <a:avLst/>
+          </a:prstGeom>
+          <a:noFill/>
+        </p:spPr>
+        <p:style>
+          <a:lnRef idx="2">
+            <a:schemeClr val="accent1">
+              <a:shade val="50000"/>
+            </a:schemeClr>
+          </a:lnRef>
+          <a:fillRef idx="1">
+            <a:schemeClr val="accent1"/>
+          </a:fillRef>
+          <a:effectRef idx="0">
+            <a:schemeClr val="accent1"/>
+          </a:effectRef>
+          <a:fontRef idx="minor">
+            <a:schemeClr val="lt1"/>
+          </a:fontRef>
+        </p:style>
+        <p:txBody>
+          <a:bodyPr rtlCol="0" anchor="ctr"/>
+          <a:lstStyle/>
+          <a:p>
+            <a:pPr algn="ctr"/>
+            <a:r>
+              <a:rPr lang="en-US" sz="1200" dirty="0">
+                <a:solidFill>
+                  <a:sysClr val="windowText" lastClr="000000"/>
+                </a:solidFill>
+              </a:rPr>
+              <a:t>APAGAR</a:t>
+            </a:r>
+          </a:p>
+        </p:txBody>
+      </p:sp>
+      <p:sp>
+        <p:nvSpPr>
+          <p:cNvPr id="24" name="Rectangle 23">
+            <a:extLst>
+              <a:ext uri="{FF2B5EF4-FFF2-40B4-BE49-F238E27FC236}">
+                <a16:creationId xmlns:a16="http://schemas.microsoft.com/office/drawing/2014/main" id="{E44E3852-FB2E-4A76-85A2-D2ABC9501081}"/>
+              </a:ext>
+            </a:extLst>
+          </p:cNvPr>
+          <p:cNvSpPr/>
+          <p:nvPr/>
+        </p:nvSpPr>
+        <p:spPr>
+          <a:xfrm>
+            <a:off x="9003149" y="4932017"/>
+            <a:ext cx="687688" cy="295123"/>
+          </a:xfrm>
+          <a:prstGeom prst="rect">
+            <a:avLst/>
+          </a:prstGeom>
+          <a:noFill/>
+        </p:spPr>
+        <p:style>
+          <a:lnRef idx="2">
+            <a:schemeClr val="accent1">
+              <a:shade val="50000"/>
+            </a:schemeClr>
+          </a:lnRef>
+          <a:fillRef idx="1">
+            <a:schemeClr val="accent1"/>
+          </a:fillRef>
+          <a:effectRef idx="0">
+            <a:schemeClr val="accent1"/>
+          </a:effectRef>
+          <a:fontRef idx="minor">
+            <a:schemeClr val="lt1"/>
+          </a:fontRef>
+        </p:style>
+        <p:txBody>
+          <a:bodyPr rtlCol="0" anchor="ctr"/>
+          <a:lstStyle/>
+          <a:p>
+            <a:pPr algn="ctr"/>
+            <a:r>
+              <a:rPr lang="en-US" sz="1200" dirty="0">
+                <a:solidFill>
+                  <a:sysClr val="windowText" lastClr="000000"/>
+                </a:solidFill>
+              </a:rPr>
+              <a:t>EDITAR</a:t>
+            </a:r>
+          </a:p>
+        </p:txBody>
+      </p:sp>
+      <p:sp>
+        <p:nvSpPr>
+          <p:cNvPr id="25" name="Rectangle 24">
+            <a:extLst>
+              <a:ext uri="{FF2B5EF4-FFF2-40B4-BE49-F238E27FC236}">
+                <a16:creationId xmlns:a16="http://schemas.microsoft.com/office/drawing/2014/main" id="{83839388-6A90-458B-BCEB-377AA193215D}"/>
+              </a:ext>
+            </a:extLst>
+          </p:cNvPr>
+          <p:cNvSpPr/>
+          <p:nvPr/>
+        </p:nvSpPr>
+        <p:spPr>
+          <a:xfrm>
+            <a:off x="9792859" y="4932016"/>
+            <a:ext cx="789707" cy="295123"/>
+          </a:xfrm>
+          <a:prstGeom prst="rect">
+            <a:avLst/>
+          </a:prstGeom>
+          <a:noFill/>
+        </p:spPr>
+        <p:style>
+          <a:lnRef idx="2">
+            <a:schemeClr val="accent1">
+              <a:shade val="50000"/>
+            </a:schemeClr>
+          </a:lnRef>
+          <a:fillRef idx="1">
+            <a:schemeClr val="accent1"/>
+          </a:fillRef>
+          <a:effectRef idx="0">
+            <a:schemeClr val="accent1"/>
+          </a:effectRef>
+          <a:fontRef idx="minor">
+            <a:schemeClr val="lt1"/>
+          </a:fontRef>
+        </p:style>
+        <p:txBody>
+          <a:bodyPr rtlCol="0" anchor="ctr"/>
+          <a:lstStyle/>
+          <a:p>
+            <a:pPr algn="ctr"/>
+            <a:r>
+              <a:rPr lang="en-US" sz="1200" dirty="0">
+                <a:solidFill>
+                  <a:sysClr val="windowText" lastClr="000000"/>
+                </a:solidFill>
+              </a:rPr>
+              <a:t>APAGAR</a:t>
+            </a:r>
+          </a:p>
+        </p:txBody>
+      </p:sp>
+      <p:sp>
+        <p:nvSpPr>
+          <p:cNvPr id="26" name="Rectangle 25">
+            <a:extLst>
+              <a:ext uri="{FF2B5EF4-FFF2-40B4-BE49-F238E27FC236}">
+                <a16:creationId xmlns:a16="http://schemas.microsoft.com/office/drawing/2014/main" id="{CCDB6D16-4EFD-4F10-84FC-318C65BC606A}"/>
+              </a:ext>
+            </a:extLst>
+          </p:cNvPr>
+          <p:cNvSpPr/>
+          <p:nvPr/>
+        </p:nvSpPr>
+        <p:spPr>
+          <a:xfrm>
+            <a:off x="9003149" y="5388507"/>
+            <a:ext cx="687688" cy="295123"/>
+          </a:xfrm>
+          <a:prstGeom prst="rect">
+            <a:avLst/>
+          </a:prstGeom>
+          <a:noFill/>
+        </p:spPr>
+        <p:style>
+          <a:lnRef idx="2">
+            <a:schemeClr val="accent1">
+              <a:shade val="50000"/>
+            </a:schemeClr>
+          </a:lnRef>
+          <a:fillRef idx="1">
+            <a:schemeClr val="accent1"/>
+          </a:fillRef>
+          <a:effectRef idx="0">
+            <a:schemeClr val="accent1"/>
+          </a:effectRef>
+          <a:fontRef idx="minor">
+            <a:schemeClr val="lt1"/>
+          </a:fontRef>
+        </p:style>
+        <p:txBody>
+          <a:bodyPr rtlCol="0" anchor="ctr"/>
+          <a:lstStyle/>
+          <a:p>
+            <a:pPr algn="ctr"/>
+            <a:r>
+              <a:rPr lang="en-US" sz="1200" dirty="0">
+                <a:solidFill>
+                  <a:sysClr val="windowText" lastClr="000000"/>
+                </a:solidFill>
+              </a:rPr>
+              <a:t>EDITAR</a:t>
+            </a:r>
+          </a:p>
+        </p:txBody>
+      </p:sp>
+      <p:sp>
+        <p:nvSpPr>
+          <p:cNvPr id="27" name="Rectangle 26">
+            <a:extLst>
+              <a:ext uri="{FF2B5EF4-FFF2-40B4-BE49-F238E27FC236}">
+                <a16:creationId xmlns:a16="http://schemas.microsoft.com/office/drawing/2014/main" id="{7F8C7DE3-0D69-44F0-BBFF-48B70D611A7A}"/>
+              </a:ext>
+            </a:extLst>
+          </p:cNvPr>
+          <p:cNvSpPr/>
+          <p:nvPr/>
+        </p:nvSpPr>
+        <p:spPr>
+          <a:xfrm>
+            <a:off x="9792859" y="5388506"/>
+            <a:ext cx="789707" cy="295123"/>
+          </a:xfrm>
+          <a:prstGeom prst="rect">
+            <a:avLst/>
+          </a:prstGeom>
+          <a:noFill/>
+        </p:spPr>
+        <p:style>
+          <a:lnRef idx="2">
+            <a:schemeClr val="accent1">
+              <a:shade val="50000"/>
+            </a:schemeClr>
+          </a:lnRef>
+          <a:fillRef idx="1">
+            <a:schemeClr val="accent1"/>
+          </a:fillRef>
+          <a:effectRef idx="0">
+            <a:schemeClr val="accent1"/>
+          </a:effectRef>
+          <a:fontRef idx="minor">
+            <a:schemeClr val="lt1"/>
+          </a:fontRef>
+        </p:style>
+        <p:txBody>
+          <a:bodyPr rtlCol="0" anchor="ctr"/>
+          <a:lstStyle/>
+          <a:p>
+            <a:pPr algn="ctr"/>
+            <a:r>
+              <a:rPr lang="en-US" sz="1200" dirty="0">
+                <a:solidFill>
+                  <a:sysClr val="windowText" lastClr="000000"/>
+                </a:solidFill>
+              </a:rPr>
+              <a:t>APAGAR</a:t>
+            </a:r>
+          </a:p>
+        </p:txBody>
+      </p:sp>
+      <p:sp>
+        <p:nvSpPr>
+          <p:cNvPr id="28" name="Rectangle 27">
+            <a:extLst>
+              <a:ext uri="{FF2B5EF4-FFF2-40B4-BE49-F238E27FC236}">
+                <a16:creationId xmlns:a16="http://schemas.microsoft.com/office/drawing/2014/main" id="{46DC2A8F-FEE4-4399-A838-2C0FC4A9920C}"/>
+              </a:ext>
+            </a:extLst>
+          </p:cNvPr>
+          <p:cNvSpPr/>
+          <p:nvPr/>
+        </p:nvSpPr>
+        <p:spPr>
+          <a:xfrm>
+            <a:off x="8421257" y="2895218"/>
+            <a:ext cx="1348509" cy="406400"/>
+          </a:xfrm>
+          <a:prstGeom prst="rect">
+            <a:avLst/>
+          </a:prstGeom>
+          <a:noFill/>
+        </p:spPr>
+        <p:style>
+          <a:lnRef idx="2">
+            <a:schemeClr val="accent1">
+              <a:shade val="50000"/>
+            </a:schemeClr>
+          </a:lnRef>
+          <a:fillRef idx="1">
+            <a:schemeClr val="accent1"/>
+          </a:fillRef>
+          <a:effectRef idx="0">
+            <a:schemeClr val="accent1"/>
+          </a:effectRef>
+          <a:fontRef idx="minor">
+            <a:schemeClr val="lt1"/>
+          </a:fontRef>
+        </p:style>
+        <p:txBody>
+          <a:bodyPr rtlCol="0" anchor="ctr"/>
+          <a:lstStyle/>
+          <a:p>
+            <a:pPr algn="ctr"/>
+            <a:r>
+              <a:rPr lang="en-US" sz="2000" dirty="0">
+                <a:solidFill>
+                  <a:sysClr val="windowText" lastClr="000000"/>
+                </a:solidFill>
+              </a:rPr>
+              <a:t>TIPO</a:t>
+            </a:r>
+          </a:p>
+        </p:txBody>
+      </p:sp>
+      <p:sp>
+        <p:nvSpPr>
+          <p:cNvPr id="30" name="Rectangle 29">
+            <a:extLst>
+              <a:ext uri="{FF2B5EF4-FFF2-40B4-BE49-F238E27FC236}">
+                <a16:creationId xmlns:a16="http://schemas.microsoft.com/office/drawing/2014/main" id="{5CA6FB5D-3418-4125-BC08-3A372BA9C62D}"/>
+              </a:ext>
+            </a:extLst>
+          </p:cNvPr>
+          <p:cNvSpPr/>
+          <p:nvPr/>
+        </p:nvSpPr>
+        <p:spPr>
+          <a:xfrm>
+            <a:off x="3093602" y="2903226"/>
+            <a:ext cx="1065648" cy="406400"/>
+          </a:xfrm>
+          <a:prstGeom prst="rect">
+            <a:avLst/>
+          </a:prstGeom>
+          <a:noFill/>
+        </p:spPr>
+        <p:style>
+          <a:lnRef idx="2">
+            <a:schemeClr val="accent1">
+              <a:shade val="50000"/>
+            </a:schemeClr>
+          </a:lnRef>
+          <a:fillRef idx="1">
+            <a:schemeClr val="accent1"/>
+          </a:fillRef>
+          <a:effectRef idx="0">
+            <a:schemeClr val="accent1"/>
+          </a:effectRef>
+          <a:fontRef idx="minor">
+            <a:schemeClr val="lt1"/>
+          </a:fontRef>
+        </p:style>
+        <p:txBody>
+          <a:bodyPr rtlCol="0" anchor="ctr"/>
+          <a:lstStyle/>
+          <a:p>
+            <a:pPr algn="ctr"/>
+            <a:r>
+              <a:rPr lang="en-US" sz="1600" dirty="0">
+                <a:solidFill>
+                  <a:sysClr val="windowText" lastClr="000000"/>
+                </a:solidFill>
+              </a:rPr>
+              <a:t>DEVICE ID</a:t>
             </a:r>
           </a:p>
         </p:txBody>
@@ -6853,6 +7714,1105 @@
     <p:extLst>
       <p:ext uri="{BB962C8B-B14F-4D97-AF65-F5344CB8AC3E}">
         <p14:creationId xmlns:p14="http://schemas.microsoft.com/office/powerpoint/2010/main" val="410240132"/>
+      </p:ext>
+    </p:extLst>
+  </p:cSld>
+  <p:clrMapOvr>
+    <a:masterClrMapping/>
+  </p:clrMapOvr>
+</p:sld>
+</file>
+
+<file path=ppt/slides/slide8.xml><?xml version="1.0" encoding="utf-8"?>
+<p:sld xmlns:a="http://schemas.openxmlformats.org/drawingml/2006/main" xmlns:r="http://schemas.openxmlformats.org/officeDocument/2006/relationships" xmlns:p="http://schemas.openxmlformats.org/presentationml/2006/main">
+  <p:cSld>
+    <p:spTree>
+      <p:nvGrpSpPr>
+        <p:cNvPr id="1" name=""/>
+        <p:cNvGrpSpPr/>
+        <p:nvPr/>
+      </p:nvGrpSpPr>
+      <p:grpSpPr>
+        <a:xfrm>
+          <a:off x="0" y="0"/>
+          <a:ext cx="0" cy="0"/>
+          <a:chOff x="0" y="0"/>
+          <a:chExt cx="0" cy="0"/>
+        </a:xfrm>
+      </p:grpSpPr>
+      <p:sp>
+        <p:nvSpPr>
+          <p:cNvPr id="4" name="Rectangle 3">
+            <a:extLst>
+              <a:ext uri="{FF2B5EF4-FFF2-40B4-BE49-F238E27FC236}">
+                <a16:creationId xmlns:a16="http://schemas.microsoft.com/office/drawing/2014/main" id="{4C0C5D4E-950E-45D6-9A61-135A343386E3}"/>
+              </a:ext>
+            </a:extLst>
+          </p:cNvPr>
+          <p:cNvSpPr/>
+          <p:nvPr/>
+        </p:nvSpPr>
+        <p:spPr>
+          <a:xfrm>
+            <a:off x="803564" y="748145"/>
+            <a:ext cx="10898909" cy="5597237"/>
+          </a:xfrm>
+          <a:prstGeom prst="rect">
+            <a:avLst/>
+          </a:prstGeom>
+          <a:noFill/>
+          <a:ln w="57150">
+            <a:solidFill>
+              <a:schemeClr val="tx1"/>
+            </a:solidFill>
+          </a:ln>
+        </p:spPr>
+        <p:style>
+          <a:lnRef idx="2">
+            <a:schemeClr val="accent1">
+              <a:shade val="50000"/>
+            </a:schemeClr>
+          </a:lnRef>
+          <a:fillRef idx="1">
+            <a:schemeClr val="accent1"/>
+          </a:fillRef>
+          <a:effectRef idx="0">
+            <a:schemeClr val="accent1"/>
+          </a:effectRef>
+          <a:fontRef idx="minor">
+            <a:schemeClr val="lt1"/>
+          </a:fontRef>
+        </p:style>
+        <p:txBody>
+          <a:bodyPr rtlCol="0" anchor="ctr"/>
+          <a:lstStyle/>
+          <a:p>
+            <a:pPr algn="ctr"/>
+            <a:endParaRPr lang="en-US" dirty="0"/>
+          </a:p>
+        </p:txBody>
+      </p:sp>
+      <p:sp>
+        <p:nvSpPr>
+          <p:cNvPr id="2" name="Rectangle 1">
+            <a:extLst>
+              <a:ext uri="{FF2B5EF4-FFF2-40B4-BE49-F238E27FC236}">
+                <a16:creationId xmlns:a16="http://schemas.microsoft.com/office/drawing/2014/main" id="{0AC54D04-63CC-45E6-9143-62E9BB219F98}"/>
+              </a:ext>
+            </a:extLst>
+          </p:cNvPr>
+          <p:cNvSpPr/>
+          <p:nvPr/>
+        </p:nvSpPr>
+        <p:spPr>
+          <a:xfrm>
+            <a:off x="2299854" y="1293108"/>
+            <a:ext cx="8497455" cy="665018"/>
+          </a:xfrm>
+          <a:prstGeom prst="rect">
+            <a:avLst/>
+          </a:prstGeom>
+          <a:noFill/>
+        </p:spPr>
+        <p:style>
+          <a:lnRef idx="2">
+            <a:schemeClr val="accent1">
+              <a:shade val="50000"/>
+            </a:schemeClr>
+          </a:lnRef>
+          <a:fillRef idx="1">
+            <a:schemeClr val="accent1"/>
+          </a:fillRef>
+          <a:effectRef idx="0">
+            <a:schemeClr val="accent1"/>
+          </a:effectRef>
+          <a:fontRef idx="minor">
+            <a:schemeClr val="lt1"/>
+          </a:fontRef>
+        </p:style>
+        <p:txBody>
+          <a:bodyPr rtlCol="0" anchor="ctr"/>
+          <a:lstStyle/>
+          <a:p>
+            <a:pPr algn="ctr"/>
+            <a:r>
+              <a:rPr lang="en-US" sz="4000" dirty="0">
+                <a:solidFill>
+                  <a:sysClr val="windowText" lastClr="000000"/>
+                </a:solidFill>
+              </a:rPr>
+              <a:t>CONFIGURAÇÕES</a:t>
+            </a:r>
+          </a:p>
+        </p:txBody>
+      </p:sp>
+      <p:sp>
+        <p:nvSpPr>
+          <p:cNvPr id="14" name="Rectangle 13">
+            <a:extLst>
+              <a:ext uri="{FF2B5EF4-FFF2-40B4-BE49-F238E27FC236}">
+                <a16:creationId xmlns:a16="http://schemas.microsoft.com/office/drawing/2014/main" id="{9A5DB28C-1A86-46FC-9297-E1BDBA6D6C3A}"/>
+              </a:ext>
+            </a:extLst>
+          </p:cNvPr>
+          <p:cNvSpPr/>
+          <p:nvPr/>
+        </p:nvSpPr>
+        <p:spPr>
+          <a:xfrm>
+            <a:off x="803564" y="748146"/>
+            <a:ext cx="10898909" cy="406400"/>
+          </a:xfrm>
+          <a:prstGeom prst="rect">
+            <a:avLst/>
+          </a:prstGeom>
+          <a:solidFill>
+            <a:srgbClr val="002060"/>
+          </a:solidFill>
+          <a:ln w="57150">
+            <a:solidFill>
+              <a:schemeClr val="tx1"/>
+            </a:solidFill>
+          </a:ln>
+        </p:spPr>
+        <p:style>
+          <a:lnRef idx="2">
+            <a:schemeClr val="accent1">
+              <a:shade val="50000"/>
+            </a:schemeClr>
+          </a:lnRef>
+          <a:fillRef idx="1">
+            <a:schemeClr val="accent1"/>
+          </a:fillRef>
+          <a:effectRef idx="0">
+            <a:schemeClr val="accent1"/>
+          </a:effectRef>
+          <a:fontRef idx="minor">
+            <a:schemeClr val="lt1"/>
+          </a:fontRef>
+        </p:style>
+        <p:txBody>
+          <a:bodyPr rtlCol="0" anchor="ctr"/>
+          <a:lstStyle/>
+          <a:p>
+            <a:pPr algn="ctr"/>
+            <a:r>
+              <a:rPr lang="en-US" dirty="0"/>
+              <a:t>MENU - COMPUTER VISION APP – TABLET 1234 –  USUARIO - SERVIDOR STATUS – SIMBOLO SCANIA</a:t>
+            </a:r>
+          </a:p>
+        </p:txBody>
+      </p:sp>
+      <p:sp>
+        <p:nvSpPr>
+          <p:cNvPr id="10" name="Rectangle 9">
+            <a:extLst>
+              <a:ext uri="{FF2B5EF4-FFF2-40B4-BE49-F238E27FC236}">
+                <a16:creationId xmlns:a16="http://schemas.microsoft.com/office/drawing/2014/main" id="{CB8891B9-B0A7-426A-819A-D8F6BDD96C6C}"/>
+              </a:ext>
+            </a:extLst>
+          </p:cNvPr>
+          <p:cNvSpPr/>
+          <p:nvPr/>
+        </p:nvSpPr>
+        <p:spPr>
+          <a:xfrm>
+            <a:off x="6548579" y="2096688"/>
+            <a:ext cx="4248728" cy="665018"/>
+          </a:xfrm>
+          <a:prstGeom prst="rect">
+            <a:avLst/>
+          </a:prstGeom>
+        </p:spPr>
+        <p:style>
+          <a:lnRef idx="3">
+            <a:schemeClr val="lt1"/>
+          </a:lnRef>
+          <a:fillRef idx="1">
+            <a:schemeClr val="accent1"/>
+          </a:fillRef>
+          <a:effectRef idx="1">
+            <a:schemeClr val="accent1"/>
+          </a:effectRef>
+          <a:fontRef idx="minor">
+            <a:schemeClr val="lt1"/>
+          </a:fontRef>
+        </p:style>
+        <p:txBody>
+          <a:bodyPr rtlCol="0" anchor="ctr"/>
+          <a:lstStyle/>
+          <a:p>
+            <a:pPr algn="ctr"/>
+            <a:r>
+              <a:rPr lang="en-US" sz="4000" dirty="0">
+                <a:solidFill>
+                  <a:sysClr val="windowText" lastClr="000000"/>
+                </a:solidFill>
+              </a:rPr>
+              <a:t>INSTANCIAS</a:t>
+            </a:r>
+          </a:p>
+        </p:txBody>
+      </p:sp>
+      <p:sp>
+        <p:nvSpPr>
+          <p:cNvPr id="6" name="Rectangle 5">
+            <a:extLst>
+              <a:ext uri="{FF2B5EF4-FFF2-40B4-BE49-F238E27FC236}">
+                <a16:creationId xmlns:a16="http://schemas.microsoft.com/office/drawing/2014/main" id="{49D29CB4-F2DC-40AB-BD83-970032F29DAF}"/>
+              </a:ext>
+            </a:extLst>
+          </p:cNvPr>
+          <p:cNvSpPr/>
+          <p:nvPr/>
+        </p:nvSpPr>
+        <p:spPr>
+          <a:xfrm>
+            <a:off x="2299852" y="2096688"/>
+            <a:ext cx="4128654" cy="665018"/>
+          </a:xfrm>
+          <a:prstGeom prst="rect">
+            <a:avLst/>
+          </a:prstGeom>
+          <a:noFill/>
+        </p:spPr>
+        <p:style>
+          <a:lnRef idx="2">
+            <a:schemeClr val="accent1">
+              <a:shade val="50000"/>
+            </a:schemeClr>
+          </a:lnRef>
+          <a:fillRef idx="1">
+            <a:schemeClr val="accent1"/>
+          </a:fillRef>
+          <a:effectRef idx="0">
+            <a:schemeClr val="accent1"/>
+          </a:effectRef>
+          <a:fontRef idx="minor">
+            <a:schemeClr val="lt1"/>
+          </a:fontRef>
+        </p:style>
+        <p:txBody>
+          <a:bodyPr rtlCol="0" anchor="ctr"/>
+          <a:lstStyle/>
+          <a:p>
+            <a:pPr algn="ctr"/>
+            <a:r>
+              <a:rPr lang="en-US" sz="4000" dirty="0">
+                <a:solidFill>
+                  <a:sysClr val="windowText" lastClr="000000"/>
+                </a:solidFill>
+              </a:rPr>
+              <a:t>TABLETS</a:t>
+            </a:r>
+          </a:p>
+        </p:txBody>
+      </p:sp>
+      <p:sp>
+        <p:nvSpPr>
+          <p:cNvPr id="7" name="Rectangle 6">
+            <a:extLst>
+              <a:ext uri="{FF2B5EF4-FFF2-40B4-BE49-F238E27FC236}">
+                <a16:creationId xmlns:a16="http://schemas.microsoft.com/office/drawing/2014/main" id="{F788C2CE-7DA8-48A3-9D27-6DDECAE6062B}"/>
+              </a:ext>
+            </a:extLst>
+          </p:cNvPr>
+          <p:cNvSpPr/>
+          <p:nvPr/>
+        </p:nvSpPr>
+        <p:spPr>
+          <a:xfrm>
+            <a:off x="2299854" y="2900268"/>
+            <a:ext cx="628074" cy="406400"/>
+          </a:xfrm>
+          <a:prstGeom prst="rect">
+            <a:avLst/>
+          </a:prstGeom>
+          <a:noFill/>
+        </p:spPr>
+        <p:style>
+          <a:lnRef idx="2">
+            <a:schemeClr val="accent1">
+              <a:shade val="50000"/>
+            </a:schemeClr>
+          </a:lnRef>
+          <a:fillRef idx="1">
+            <a:schemeClr val="accent1"/>
+          </a:fillRef>
+          <a:effectRef idx="0">
+            <a:schemeClr val="accent1"/>
+          </a:effectRef>
+          <a:fontRef idx="minor">
+            <a:schemeClr val="lt1"/>
+          </a:fontRef>
+        </p:style>
+        <p:txBody>
+          <a:bodyPr rtlCol="0" anchor="ctr"/>
+          <a:lstStyle/>
+          <a:p>
+            <a:pPr algn="ctr"/>
+            <a:r>
+              <a:rPr lang="en-US" sz="2000" dirty="0">
+                <a:solidFill>
+                  <a:sysClr val="windowText" lastClr="000000"/>
+                </a:solidFill>
+              </a:rPr>
+              <a:t>ID</a:t>
+            </a:r>
+          </a:p>
+        </p:txBody>
+      </p:sp>
+      <p:sp>
+        <p:nvSpPr>
+          <p:cNvPr id="8" name="Rectangle 7">
+            <a:extLst>
+              <a:ext uri="{FF2B5EF4-FFF2-40B4-BE49-F238E27FC236}">
+                <a16:creationId xmlns:a16="http://schemas.microsoft.com/office/drawing/2014/main" id="{511256CA-35C8-4664-9CB8-BE290A0F00F8}"/>
+              </a:ext>
+            </a:extLst>
+          </p:cNvPr>
+          <p:cNvSpPr/>
+          <p:nvPr/>
+        </p:nvSpPr>
+        <p:spPr>
+          <a:xfrm>
+            <a:off x="2299853" y="3830948"/>
+            <a:ext cx="8497455" cy="406400"/>
+          </a:xfrm>
+          <a:prstGeom prst="rect">
+            <a:avLst/>
+          </a:prstGeom>
+          <a:noFill/>
+        </p:spPr>
+        <p:style>
+          <a:lnRef idx="2">
+            <a:schemeClr val="accent1">
+              <a:shade val="50000"/>
+            </a:schemeClr>
+          </a:lnRef>
+          <a:fillRef idx="1">
+            <a:schemeClr val="accent1"/>
+          </a:fillRef>
+          <a:effectRef idx="0">
+            <a:schemeClr val="accent1"/>
+          </a:effectRef>
+          <a:fontRef idx="minor">
+            <a:schemeClr val="lt1"/>
+          </a:fontRef>
+        </p:style>
+        <p:txBody>
+          <a:bodyPr rtlCol="0" anchor="ctr"/>
+          <a:lstStyle/>
+          <a:p>
+            <a:pPr algn="ctr"/>
+            <a:endParaRPr lang="en-US" sz="4000" dirty="0">
+              <a:solidFill>
+                <a:sysClr val="windowText" lastClr="000000"/>
+              </a:solidFill>
+            </a:endParaRPr>
+          </a:p>
+        </p:txBody>
+      </p:sp>
+      <p:sp>
+        <p:nvSpPr>
+          <p:cNvPr id="9" name="Rectangle 8">
+            <a:extLst>
+              <a:ext uri="{FF2B5EF4-FFF2-40B4-BE49-F238E27FC236}">
+                <a16:creationId xmlns:a16="http://schemas.microsoft.com/office/drawing/2014/main" id="{A63EEEF5-AC7D-4A6C-8D22-B131B667A549}"/>
+              </a:ext>
+            </a:extLst>
+          </p:cNvPr>
+          <p:cNvSpPr/>
+          <p:nvPr/>
+        </p:nvSpPr>
+        <p:spPr>
+          <a:xfrm>
+            <a:off x="2299852" y="4294028"/>
+            <a:ext cx="8497455" cy="406400"/>
+          </a:xfrm>
+          <a:prstGeom prst="rect">
+            <a:avLst/>
+          </a:prstGeom>
+          <a:noFill/>
+        </p:spPr>
+        <p:style>
+          <a:lnRef idx="2">
+            <a:schemeClr val="accent1">
+              <a:shade val="50000"/>
+            </a:schemeClr>
+          </a:lnRef>
+          <a:fillRef idx="1">
+            <a:schemeClr val="accent1"/>
+          </a:fillRef>
+          <a:effectRef idx="0">
+            <a:schemeClr val="accent1"/>
+          </a:effectRef>
+          <a:fontRef idx="minor">
+            <a:schemeClr val="lt1"/>
+          </a:fontRef>
+        </p:style>
+        <p:txBody>
+          <a:bodyPr rtlCol="0" anchor="ctr"/>
+          <a:lstStyle/>
+          <a:p>
+            <a:pPr algn="ctr"/>
+            <a:endParaRPr lang="en-US" sz="4000" dirty="0">
+              <a:solidFill>
+                <a:sysClr val="windowText" lastClr="000000"/>
+              </a:solidFill>
+            </a:endParaRPr>
+          </a:p>
+        </p:txBody>
+      </p:sp>
+      <p:sp>
+        <p:nvSpPr>
+          <p:cNvPr id="11" name="Rectangle 10">
+            <a:extLst>
+              <a:ext uri="{FF2B5EF4-FFF2-40B4-BE49-F238E27FC236}">
+                <a16:creationId xmlns:a16="http://schemas.microsoft.com/office/drawing/2014/main" id="{1F4CCA34-6EFA-46F8-807A-6846549542F6}"/>
+              </a:ext>
+            </a:extLst>
+          </p:cNvPr>
+          <p:cNvSpPr/>
+          <p:nvPr/>
+        </p:nvSpPr>
+        <p:spPr>
+          <a:xfrm>
+            <a:off x="2299853" y="3367868"/>
+            <a:ext cx="8497455" cy="406400"/>
+          </a:xfrm>
+          <a:prstGeom prst="rect">
+            <a:avLst/>
+          </a:prstGeom>
+          <a:noFill/>
+        </p:spPr>
+        <p:style>
+          <a:lnRef idx="2">
+            <a:schemeClr val="accent1">
+              <a:shade val="50000"/>
+            </a:schemeClr>
+          </a:lnRef>
+          <a:fillRef idx="1">
+            <a:schemeClr val="accent1"/>
+          </a:fillRef>
+          <a:effectRef idx="0">
+            <a:schemeClr val="accent1"/>
+          </a:effectRef>
+          <a:fontRef idx="minor">
+            <a:schemeClr val="lt1"/>
+          </a:fontRef>
+        </p:style>
+        <p:txBody>
+          <a:bodyPr rtlCol="0" anchor="ctr"/>
+          <a:lstStyle/>
+          <a:p>
+            <a:pPr algn="ctr"/>
+            <a:endParaRPr lang="en-US" sz="4000" dirty="0">
+              <a:solidFill>
+                <a:sysClr val="windowText" lastClr="000000"/>
+              </a:solidFill>
+            </a:endParaRPr>
+          </a:p>
+        </p:txBody>
+      </p:sp>
+      <p:sp>
+        <p:nvSpPr>
+          <p:cNvPr id="17" name="Rectangle 16">
+            <a:extLst>
+              <a:ext uri="{FF2B5EF4-FFF2-40B4-BE49-F238E27FC236}">
+                <a16:creationId xmlns:a16="http://schemas.microsoft.com/office/drawing/2014/main" id="{BE0E6460-3D59-4D31-AEFC-AE479A507D69}"/>
+              </a:ext>
+            </a:extLst>
+          </p:cNvPr>
+          <p:cNvSpPr/>
+          <p:nvPr/>
+        </p:nvSpPr>
+        <p:spPr>
+          <a:xfrm>
+            <a:off x="3177309" y="2900268"/>
+            <a:ext cx="628074" cy="406400"/>
+          </a:xfrm>
+          <a:prstGeom prst="rect">
+            <a:avLst/>
+          </a:prstGeom>
+          <a:noFill/>
+        </p:spPr>
+        <p:style>
+          <a:lnRef idx="2">
+            <a:schemeClr val="accent1">
+              <a:shade val="50000"/>
+            </a:schemeClr>
+          </a:lnRef>
+          <a:fillRef idx="1">
+            <a:schemeClr val="accent1"/>
+          </a:fillRef>
+          <a:effectRef idx="0">
+            <a:schemeClr val="accent1"/>
+          </a:effectRef>
+          <a:fontRef idx="minor">
+            <a:schemeClr val="lt1"/>
+          </a:fontRef>
+        </p:style>
+        <p:txBody>
+          <a:bodyPr rtlCol="0" anchor="ctr"/>
+          <a:lstStyle/>
+          <a:p>
+            <a:pPr algn="ctr"/>
+            <a:r>
+              <a:rPr lang="en-US" sz="2000" dirty="0">
+                <a:solidFill>
+                  <a:sysClr val="windowText" lastClr="000000"/>
+                </a:solidFill>
+              </a:rPr>
+              <a:t>IP</a:t>
+            </a:r>
+          </a:p>
+        </p:txBody>
+      </p:sp>
+      <p:sp>
+        <p:nvSpPr>
+          <p:cNvPr id="18" name="Rectangle 17">
+            <a:extLst>
+              <a:ext uri="{FF2B5EF4-FFF2-40B4-BE49-F238E27FC236}">
+                <a16:creationId xmlns:a16="http://schemas.microsoft.com/office/drawing/2014/main" id="{9A1AF453-8D36-4BC7-BF73-E23180589924}"/>
+              </a:ext>
+            </a:extLst>
+          </p:cNvPr>
+          <p:cNvSpPr/>
+          <p:nvPr/>
+        </p:nvSpPr>
+        <p:spPr>
+          <a:xfrm>
+            <a:off x="4054763" y="2900268"/>
+            <a:ext cx="1348509" cy="406400"/>
+          </a:xfrm>
+          <a:prstGeom prst="rect">
+            <a:avLst/>
+          </a:prstGeom>
+          <a:noFill/>
+        </p:spPr>
+        <p:style>
+          <a:lnRef idx="2">
+            <a:schemeClr val="accent1">
+              <a:shade val="50000"/>
+            </a:schemeClr>
+          </a:lnRef>
+          <a:fillRef idx="1">
+            <a:schemeClr val="accent1"/>
+          </a:fillRef>
+          <a:effectRef idx="0">
+            <a:schemeClr val="accent1"/>
+          </a:effectRef>
+          <a:fontRef idx="minor">
+            <a:schemeClr val="lt1"/>
+          </a:fontRef>
+        </p:style>
+        <p:txBody>
+          <a:bodyPr rtlCol="0" anchor="ctr"/>
+          <a:lstStyle/>
+          <a:p>
+            <a:pPr algn="ctr"/>
+            <a:r>
+              <a:rPr lang="en-US" sz="2000" dirty="0">
+                <a:solidFill>
+                  <a:sysClr val="windowText" lastClr="000000"/>
+                </a:solidFill>
+              </a:rPr>
+              <a:t>INSTANCIA</a:t>
+            </a:r>
+          </a:p>
+        </p:txBody>
+      </p:sp>
+      <p:sp>
+        <p:nvSpPr>
+          <p:cNvPr id="19" name="Rectangle 18">
+            <a:extLst>
+              <a:ext uri="{FF2B5EF4-FFF2-40B4-BE49-F238E27FC236}">
+                <a16:creationId xmlns:a16="http://schemas.microsoft.com/office/drawing/2014/main" id="{06C122F2-39D3-4773-85B4-A7DBF458ADA3}"/>
+              </a:ext>
+            </a:extLst>
+          </p:cNvPr>
+          <p:cNvSpPr/>
+          <p:nvPr/>
+        </p:nvSpPr>
+        <p:spPr>
+          <a:xfrm>
+            <a:off x="5578763" y="2900268"/>
+            <a:ext cx="1348509" cy="406400"/>
+          </a:xfrm>
+          <a:prstGeom prst="rect">
+            <a:avLst/>
+          </a:prstGeom>
+          <a:noFill/>
+        </p:spPr>
+        <p:style>
+          <a:lnRef idx="2">
+            <a:schemeClr val="accent1">
+              <a:shade val="50000"/>
+            </a:schemeClr>
+          </a:lnRef>
+          <a:fillRef idx="1">
+            <a:schemeClr val="accent1"/>
+          </a:fillRef>
+          <a:effectRef idx="0">
+            <a:schemeClr val="accent1"/>
+          </a:effectRef>
+          <a:fontRef idx="minor">
+            <a:schemeClr val="lt1"/>
+          </a:fontRef>
+        </p:style>
+        <p:txBody>
+          <a:bodyPr rtlCol="0" anchor="ctr"/>
+          <a:lstStyle/>
+          <a:p>
+            <a:pPr algn="ctr"/>
+            <a:r>
+              <a:rPr lang="en-US" sz="2000" dirty="0">
+                <a:solidFill>
+                  <a:sysClr val="windowText" lastClr="000000"/>
+                </a:solidFill>
+              </a:rPr>
+              <a:t>USUARIO</a:t>
+            </a:r>
+          </a:p>
+        </p:txBody>
+      </p:sp>
+      <p:sp>
+        <p:nvSpPr>
+          <p:cNvPr id="22" name="Rectangle 21">
+            <a:extLst>
+              <a:ext uri="{FF2B5EF4-FFF2-40B4-BE49-F238E27FC236}">
+                <a16:creationId xmlns:a16="http://schemas.microsoft.com/office/drawing/2014/main" id="{E42EC5B2-AC7A-4CB7-873F-46CC99ED3368}"/>
+              </a:ext>
+            </a:extLst>
+          </p:cNvPr>
+          <p:cNvSpPr/>
+          <p:nvPr/>
+        </p:nvSpPr>
+        <p:spPr>
+          <a:xfrm>
+            <a:off x="9005456" y="3436622"/>
+            <a:ext cx="687688" cy="295123"/>
+          </a:xfrm>
+          <a:prstGeom prst="rect">
+            <a:avLst/>
+          </a:prstGeom>
+          <a:noFill/>
+        </p:spPr>
+        <p:style>
+          <a:lnRef idx="2">
+            <a:schemeClr val="accent1">
+              <a:shade val="50000"/>
+            </a:schemeClr>
+          </a:lnRef>
+          <a:fillRef idx="1">
+            <a:schemeClr val="accent1"/>
+          </a:fillRef>
+          <a:effectRef idx="0">
+            <a:schemeClr val="accent1"/>
+          </a:effectRef>
+          <a:fontRef idx="minor">
+            <a:schemeClr val="lt1"/>
+          </a:fontRef>
+        </p:style>
+        <p:txBody>
+          <a:bodyPr rtlCol="0" anchor="ctr"/>
+          <a:lstStyle/>
+          <a:p>
+            <a:pPr algn="ctr"/>
+            <a:r>
+              <a:rPr lang="en-US" sz="1200" dirty="0">
+                <a:solidFill>
+                  <a:sysClr val="windowText" lastClr="000000"/>
+                </a:solidFill>
+              </a:rPr>
+              <a:t>EDITAR</a:t>
+            </a:r>
+          </a:p>
+        </p:txBody>
+      </p:sp>
+      <p:sp>
+        <p:nvSpPr>
+          <p:cNvPr id="23" name="Rectangle 22">
+            <a:extLst>
+              <a:ext uri="{FF2B5EF4-FFF2-40B4-BE49-F238E27FC236}">
+                <a16:creationId xmlns:a16="http://schemas.microsoft.com/office/drawing/2014/main" id="{EE8A9930-19D4-465E-801D-609FCBD89FED}"/>
+              </a:ext>
+            </a:extLst>
+          </p:cNvPr>
+          <p:cNvSpPr/>
+          <p:nvPr/>
+        </p:nvSpPr>
+        <p:spPr>
+          <a:xfrm>
+            <a:off x="9795166" y="3436621"/>
+            <a:ext cx="789707" cy="295123"/>
+          </a:xfrm>
+          <a:prstGeom prst="rect">
+            <a:avLst/>
+          </a:prstGeom>
+          <a:noFill/>
+        </p:spPr>
+        <p:style>
+          <a:lnRef idx="2">
+            <a:schemeClr val="accent1">
+              <a:shade val="50000"/>
+            </a:schemeClr>
+          </a:lnRef>
+          <a:fillRef idx="1">
+            <a:schemeClr val="accent1"/>
+          </a:fillRef>
+          <a:effectRef idx="0">
+            <a:schemeClr val="accent1"/>
+          </a:effectRef>
+          <a:fontRef idx="minor">
+            <a:schemeClr val="lt1"/>
+          </a:fontRef>
+        </p:style>
+        <p:txBody>
+          <a:bodyPr rtlCol="0" anchor="ctr"/>
+          <a:lstStyle/>
+          <a:p>
+            <a:pPr algn="ctr"/>
+            <a:r>
+              <a:rPr lang="en-US" sz="1200" dirty="0">
+                <a:solidFill>
+                  <a:sysClr val="windowText" lastClr="000000"/>
+                </a:solidFill>
+              </a:rPr>
+              <a:t>APAGAR</a:t>
+            </a:r>
+          </a:p>
+        </p:txBody>
+      </p:sp>
+      <p:sp>
+        <p:nvSpPr>
+          <p:cNvPr id="24" name="Rectangle 23">
+            <a:extLst>
+              <a:ext uri="{FF2B5EF4-FFF2-40B4-BE49-F238E27FC236}">
+                <a16:creationId xmlns:a16="http://schemas.microsoft.com/office/drawing/2014/main" id="{E44E3852-FB2E-4A76-85A2-D2ABC9501081}"/>
+              </a:ext>
+            </a:extLst>
+          </p:cNvPr>
+          <p:cNvSpPr/>
+          <p:nvPr/>
+        </p:nvSpPr>
+        <p:spPr>
+          <a:xfrm>
+            <a:off x="9005456" y="3886587"/>
+            <a:ext cx="687688" cy="295123"/>
+          </a:xfrm>
+          <a:prstGeom prst="rect">
+            <a:avLst/>
+          </a:prstGeom>
+          <a:noFill/>
+        </p:spPr>
+        <p:style>
+          <a:lnRef idx="2">
+            <a:schemeClr val="accent1">
+              <a:shade val="50000"/>
+            </a:schemeClr>
+          </a:lnRef>
+          <a:fillRef idx="1">
+            <a:schemeClr val="accent1"/>
+          </a:fillRef>
+          <a:effectRef idx="0">
+            <a:schemeClr val="accent1"/>
+          </a:effectRef>
+          <a:fontRef idx="minor">
+            <a:schemeClr val="lt1"/>
+          </a:fontRef>
+        </p:style>
+        <p:txBody>
+          <a:bodyPr rtlCol="0" anchor="ctr"/>
+          <a:lstStyle/>
+          <a:p>
+            <a:pPr algn="ctr"/>
+            <a:r>
+              <a:rPr lang="en-US" sz="1200" dirty="0">
+                <a:solidFill>
+                  <a:sysClr val="windowText" lastClr="000000"/>
+                </a:solidFill>
+              </a:rPr>
+              <a:t>EDITAR</a:t>
+            </a:r>
+          </a:p>
+        </p:txBody>
+      </p:sp>
+      <p:sp>
+        <p:nvSpPr>
+          <p:cNvPr id="25" name="Rectangle 24">
+            <a:extLst>
+              <a:ext uri="{FF2B5EF4-FFF2-40B4-BE49-F238E27FC236}">
+                <a16:creationId xmlns:a16="http://schemas.microsoft.com/office/drawing/2014/main" id="{83839388-6A90-458B-BCEB-377AA193215D}"/>
+              </a:ext>
+            </a:extLst>
+          </p:cNvPr>
+          <p:cNvSpPr/>
+          <p:nvPr/>
+        </p:nvSpPr>
+        <p:spPr>
+          <a:xfrm>
+            <a:off x="9795166" y="3886586"/>
+            <a:ext cx="789707" cy="295123"/>
+          </a:xfrm>
+          <a:prstGeom prst="rect">
+            <a:avLst/>
+          </a:prstGeom>
+          <a:noFill/>
+        </p:spPr>
+        <p:style>
+          <a:lnRef idx="2">
+            <a:schemeClr val="accent1">
+              <a:shade val="50000"/>
+            </a:schemeClr>
+          </a:lnRef>
+          <a:fillRef idx="1">
+            <a:schemeClr val="accent1"/>
+          </a:fillRef>
+          <a:effectRef idx="0">
+            <a:schemeClr val="accent1"/>
+          </a:effectRef>
+          <a:fontRef idx="minor">
+            <a:schemeClr val="lt1"/>
+          </a:fontRef>
+        </p:style>
+        <p:txBody>
+          <a:bodyPr rtlCol="0" anchor="ctr"/>
+          <a:lstStyle/>
+          <a:p>
+            <a:pPr algn="ctr"/>
+            <a:r>
+              <a:rPr lang="en-US" sz="1200" dirty="0">
+                <a:solidFill>
+                  <a:sysClr val="windowText" lastClr="000000"/>
+                </a:solidFill>
+              </a:rPr>
+              <a:t>APAGAR</a:t>
+            </a:r>
+          </a:p>
+        </p:txBody>
+      </p:sp>
+      <p:sp>
+        <p:nvSpPr>
+          <p:cNvPr id="26" name="Rectangle 25">
+            <a:extLst>
+              <a:ext uri="{FF2B5EF4-FFF2-40B4-BE49-F238E27FC236}">
+                <a16:creationId xmlns:a16="http://schemas.microsoft.com/office/drawing/2014/main" id="{CCDB6D16-4EFD-4F10-84FC-318C65BC606A}"/>
+              </a:ext>
+            </a:extLst>
+          </p:cNvPr>
+          <p:cNvSpPr/>
+          <p:nvPr/>
+        </p:nvSpPr>
+        <p:spPr>
+          <a:xfrm>
+            <a:off x="9005456" y="4343077"/>
+            <a:ext cx="687688" cy="295123"/>
+          </a:xfrm>
+          <a:prstGeom prst="rect">
+            <a:avLst/>
+          </a:prstGeom>
+          <a:noFill/>
+        </p:spPr>
+        <p:style>
+          <a:lnRef idx="2">
+            <a:schemeClr val="accent1">
+              <a:shade val="50000"/>
+            </a:schemeClr>
+          </a:lnRef>
+          <a:fillRef idx="1">
+            <a:schemeClr val="accent1"/>
+          </a:fillRef>
+          <a:effectRef idx="0">
+            <a:schemeClr val="accent1"/>
+          </a:effectRef>
+          <a:fontRef idx="minor">
+            <a:schemeClr val="lt1"/>
+          </a:fontRef>
+        </p:style>
+        <p:txBody>
+          <a:bodyPr rtlCol="0" anchor="ctr"/>
+          <a:lstStyle/>
+          <a:p>
+            <a:pPr algn="ctr"/>
+            <a:r>
+              <a:rPr lang="en-US" sz="1200" dirty="0">
+                <a:solidFill>
+                  <a:sysClr val="windowText" lastClr="000000"/>
+                </a:solidFill>
+              </a:rPr>
+              <a:t>EDITAR</a:t>
+            </a:r>
+          </a:p>
+        </p:txBody>
+      </p:sp>
+      <p:sp>
+        <p:nvSpPr>
+          <p:cNvPr id="27" name="Rectangle 26">
+            <a:extLst>
+              <a:ext uri="{FF2B5EF4-FFF2-40B4-BE49-F238E27FC236}">
+                <a16:creationId xmlns:a16="http://schemas.microsoft.com/office/drawing/2014/main" id="{7F8C7DE3-0D69-44F0-BBFF-48B70D611A7A}"/>
+              </a:ext>
+            </a:extLst>
+          </p:cNvPr>
+          <p:cNvSpPr/>
+          <p:nvPr/>
+        </p:nvSpPr>
+        <p:spPr>
+          <a:xfrm>
+            <a:off x="9795166" y="4343076"/>
+            <a:ext cx="789707" cy="295123"/>
+          </a:xfrm>
+          <a:prstGeom prst="rect">
+            <a:avLst/>
+          </a:prstGeom>
+          <a:noFill/>
+        </p:spPr>
+        <p:style>
+          <a:lnRef idx="2">
+            <a:schemeClr val="accent1">
+              <a:shade val="50000"/>
+            </a:schemeClr>
+          </a:lnRef>
+          <a:fillRef idx="1">
+            <a:schemeClr val="accent1"/>
+          </a:fillRef>
+          <a:effectRef idx="0">
+            <a:schemeClr val="accent1"/>
+          </a:effectRef>
+          <a:fontRef idx="minor">
+            <a:schemeClr val="lt1"/>
+          </a:fontRef>
+        </p:style>
+        <p:txBody>
+          <a:bodyPr rtlCol="0" anchor="ctr"/>
+          <a:lstStyle/>
+          <a:p>
+            <a:pPr algn="ctr"/>
+            <a:r>
+              <a:rPr lang="en-US" sz="1200" dirty="0">
+                <a:solidFill>
+                  <a:sysClr val="windowText" lastClr="000000"/>
+                </a:solidFill>
+              </a:rPr>
+              <a:t>APAGAR</a:t>
+            </a:r>
+          </a:p>
+        </p:txBody>
+      </p:sp>
+      <p:sp>
+        <p:nvSpPr>
+          <p:cNvPr id="28" name="Rectangle 27">
+            <a:extLst>
+              <a:ext uri="{FF2B5EF4-FFF2-40B4-BE49-F238E27FC236}">
+                <a16:creationId xmlns:a16="http://schemas.microsoft.com/office/drawing/2014/main" id="{46DC2A8F-FEE4-4399-A838-2C0FC4A9920C}"/>
+              </a:ext>
+            </a:extLst>
+          </p:cNvPr>
+          <p:cNvSpPr/>
+          <p:nvPr/>
+        </p:nvSpPr>
+        <p:spPr>
+          <a:xfrm>
+            <a:off x="7174348" y="2895218"/>
+            <a:ext cx="1348509" cy="406400"/>
+          </a:xfrm>
+          <a:prstGeom prst="rect">
+            <a:avLst/>
+          </a:prstGeom>
+          <a:noFill/>
+        </p:spPr>
+        <p:style>
+          <a:lnRef idx="2">
+            <a:schemeClr val="accent1">
+              <a:shade val="50000"/>
+            </a:schemeClr>
+          </a:lnRef>
+          <a:fillRef idx="1">
+            <a:schemeClr val="accent1"/>
+          </a:fillRef>
+          <a:effectRef idx="0">
+            <a:schemeClr val="accent1"/>
+          </a:effectRef>
+          <a:fontRef idx="minor">
+            <a:schemeClr val="lt1"/>
+          </a:fontRef>
+        </p:style>
+        <p:txBody>
+          <a:bodyPr rtlCol="0" anchor="ctr"/>
+          <a:lstStyle/>
+          <a:p>
+            <a:pPr algn="ctr"/>
+            <a:r>
+              <a:rPr lang="en-US" sz="2000" dirty="0">
+                <a:solidFill>
+                  <a:sysClr val="windowText" lastClr="000000"/>
+                </a:solidFill>
+              </a:rPr>
+              <a:t>TIPO</a:t>
+            </a:r>
+          </a:p>
+        </p:txBody>
+      </p:sp>
+      <p:sp>
+        <p:nvSpPr>
+          <p:cNvPr id="29" name="Rectangle 28">
+            <a:extLst>
+              <a:ext uri="{FF2B5EF4-FFF2-40B4-BE49-F238E27FC236}">
+                <a16:creationId xmlns:a16="http://schemas.microsoft.com/office/drawing/2014/main" id="{205BECEA-1F70-43B2-AF4E-7D58A4862D20}"/>
+              </a:ext>
+            </a:extLst>
+          </p:cNvPr>
+          <p:cNvSpPr/>
+          <p:nvPr/>
+        </p:nvSpPr>
+        <p:spPr>
+          <a:xfrm>
+            <a:off x="9446492" y="2905829"/>
+            <a:ext cx="1348509" cy="406400"/>
+          </a:xfrm>
+          <a:prstGeom prst="rect">
+            <a:avLst/>
+          </a:prstGeom>
+          <a:noFill/>
+        </p:spPr>
+        <p:style>
+          <a:lnRef idx="2">
+            <a:schemeClr val="accent1">
+              <a:shade val="50000"/>
+            </a:schemeClr>
+          </a:lnRef>
+          <a:fillRef idx="1">
+            <a:schemeClr val="accent1"/>
+          </a:fillRef>
+          <a:effectRef idx="0">
+            <a:schemeClr val="accent1"/>
+          </a:effectRef>
+          <a:fontRef idx="minor">
+            <a:schemeClr val="lt1"/>
+          </a:fontRef>
+        </p:style>
+        <p:txBody>
+          <a:bodyPr rtlCol="0" anchor="ctr"/>
+          <a:lstStyle/>
+          <a:p>
+            <a:pPr algn="ctr"/>
+            <a:r>
+              <a:rPr lang="en-US" sz="1600" dirty="0">
+                <a:solidFill>
+                  <a:sysClr val="windowText" lastClr="000000"/>
+                </a:solidFill>
+              </a:rPr>
+              <a:t>CRIADO EM</a:t>
+            </a:r>
+          </a:p>
+        </p:txBody>
+      </p:sp>
+    </p:spTree>
+    <p:extLst>
+      <p:ext uri="{BB962C8B-B14F-4D97-AF65-F5344CB8AC3E}">
+        <p14:creationId xmlns:p14="http://schemas.microsoft.com/office/powerpoint/2010/main" val="2210783150"/>
       </p:ext>
     </p:extLst>
   </p:cSld>

</xml_diff>